<commit_message>
Updated PP xmlprague 2017.
</commit_message>
<xml_diff>
--- a/doc/foxpath-xmlprague-2017-pp.pptx
+++ b/doc/foxpath-xmlprague-2017-pp.pptx
@@ -2540,7 +2540,15 @@
             </a:r>
             <a:r>
               <a:rPr lang="de-DE" baseline="0" dirty="0" smtClean="0"/>
-              <a:t> defined two data formats for specifying literal file systems: UTREE – XML-based, UGRAPH – RDF-based.</a:t>
+              <a:t> defined two data formats for </a:t>
+            </a:r>
+            <a:r>
+              <a:rPr lang="de-DE" baseline="0" dirty="0" smtClean="0"/>
+              <a:t>creating literal </a:t>
+            </a:r>
+            <a:r>
+              <a:rPr lang="de-DE" baseline="0" dirty="0" smtClean="0"/>
+              <a:t>file systems: UTREE – XML-based, UGRAPH – RDF-based.</a:t>
             </a:r>
             <a:endParaRPr lang="de-DE" dirty="0" smtClean="0"/>
           </a:p>
@@ -2634,7 +2642,11 @@
           <a:p>
             <a:r>
               <a:rPr lang="de-DE" dirty="0" smtClean="0"/>
-              <a:t>Note the distinction between a navigation URI and a retrieval URI: they may,</a:t>
+              <a:t>The key properties are a </a:t>
+            </a:r>
+            <a:r>
+              <a:rPr lang="de-DE" dirty="0" smtClean="0"/>
+              <a:t>navigation URI and a retrieval URI: they may,</a:t>
             </a:r>
             <a:r>
               <a:rPr lang="de-DE" baseline="0" dirty="0" smtClean="0"/>
@@ -32720,14 +32732,27 @@
           <a:p>
             <a:r>
               <a:rPr lang="de-DE" sz="2400" dirty="0" smtClean="0"/>
-              <a:t>    * Node navigation</a:t>
-            </a:r>
-          </a:p>
-          <a:p>
+              <a:t>   * </a:t>
+            </a:r>
             <a:r>
               <a:rPr lang="de-DE" sz="2400" dirty="0" smtClean="0"/>
-              <a:t>    * URI navigation</a:t>
-            </a:r>
+              <a:t>URI </a:t>
+            </a:r>
+            <a:r>
+              <a:rPr lang="de-DE" sz="2400" dirty="0" smtClean="0"/>
+              <a:t>navigation</a:t>
+            </a:r>
+          </a:p>
+          <a:p>
+            <a:r>
+              <a:rPr lang="de-DE" sz="2400" dirty="0" smtClean="0"/>
+              <a:t>   </a:t>
+            </a:r>
+            <a:r>
+              <a:rPr lang="de-DE" sz="2400" dirty="0"/>
+              <a:t>* Node navigation</a:t>
+            </a:r>
+            <a:endParaRPr lang="de-DE" sz="2400" dirty="0" smtClean="0"/>
           </a:p>
           <a:p>
             <a:endParaRPr lang="de-DE" sz="2400" dirty="0"/>

</xml_diff>